<commit_message>
fixed errors in slides, updated notebook
</commit_message>
<xml_diff>
--- a/Second_Draft.pptx
+++ b/Second_Draft.pptx
@@ -1111,7 +1111,7 @@
           <a:p>
             <a:fld id="{7F612655-39F8-F347-982F-58746B965C3A}" type="datetimeFigureOut">
               <a:rPr lang="en-US" smtClean="0"/>
-              <a:t>3/14/23</a:t>
+              <a:t>3/15/23</a:t>
             </a:fld>
             <a:endParaRPr lang="en-US"/>
           </a:p>
@@ -9767,7 +9767,7 @@
           <p:nvPr>
             <p:extLst>
               <p:ext uri="{D42A27DB-BD31-4B8C-83A1-F6EECF244321}">
-                <p14:modId xmlns:p14="http://schemas.microsoft.com/office/powerpoint/2010/main" val="3639992007"/>
+                <p14:modId xmlns:p14="http://schemas.microsoft.com/office/powerpoint/2010/main" val="2614629613"/>
               </p:ext>
             </p:extLst>
           </p:nvPr>
@@ -9783,35 +9783,42 @@
                 <a:tableStyleId>{5C22544A-7EE6-4342-B048-85BDC9FD1C3A}</a:tableStyleId>
               </a:tblPr>
               <a:tblGrid>
-                <a:gridCol w="1700784">
+                <a:gridCol w="1417320">
                   <a:extLst>
                     <a:ext uri="{9D8B030D-6E8A-4147-A177-3AD203B41FA5}">
                       <a16:colId xmlns:a16="http://schemas.microsoft.com/office/drawing/2014/main" val="2812415835"/>
                     </a:ext>
                   </a:extLst>
                 </a:gridCol>
-                <a:gridCol w="1700784">
+                <a:gridCol w="1417320">
+                  <a:extLst>
+                    <a:ext uri="{9D8B030D-6E8A-4147-A177-3AD203B41FA5}">
+                      <a16:colId xmlns:a16="http://schemas.microsoft.com/office/drawing/2014/main" val="3074242203"/>
+                    </a:ext>
+                  </a:extLst>
+                </a:gridCol>
+                <a:gridCol w="1417320">
                   <a:extLst>
                     <a:ext uri="{9D8B030D-6E8A-4147-A177-3AD203B41FA5}">
                       <a16:colId xmlns:a16="http://schemas.microsoft.com/office/drawing/2014/main" val="1597612126"/>
                     </a:ext>
                   </a:extLst>
                 </a:gridCol>
-                <a:gridCol w="1700784">
+                <a:gridCol w="1417320">
                   <a:extLst>
                     <a:ext uri="{9D8B030D-6E8A-4147-A177-3AD203B41FA5}">
                       <a16:colId xmlns:a16="http://schemas.microsoft.com/office/drawing/2014/main" val="1570262287"/>
                     </a:ext>
                   </a:extLst>
                 </a:gridCol>
-                <a:gridCol w="1700784">
+                <a:gridCol w="1417320">
                   <a:extLst>
                     <a:ext uri="{9D8B030D-6E8A-4147-A177-3AD203B41FA5}">
                       <a16:colId xmlns:a16="http://schemas.microsoft.com/office/drawing/2014/main" val="4014363287"/>
                     </a:ext>
                   </a:extLst>
                 </a:gridCol>
-                <a:gridCol w="1700784">
+                <a:gridCol w="1417320">
                   <a:extLst>
                     <a:ext uri="{9D8B030D-6E8A-4147-A177-3AD203B41FA5}">
                       <a16:colId xmlns:a16="http://schemas.microsoft.com/office/drawing/2014/main" val="489630985"/>
@@ -9876,6 +9883,56 @@
                           <a:ea typeface="+mn-ea"/>
                           <a:cs typeface="+mn-cs"/>
                         </a:rPr>
+                        <a:t>$ 0.0</a:t>
+                      </a:r>
+                    </a:p>
+                  </a:txBody>
+                  <a:tcPr>
+                    <a:lnL w="12700" cap="flat" cmpd="sng" algn="ctr">
+                      <a:solidFill>
+                        <a:schemeClr val="tx1"/>
+                      </a:solidFill>
+                      <a:prstDash val="solid"/>
+                      <a:round/>
+                      <a:headEnd type="none" w="med" len="med"/>
+                      <a:tailEnd type="none" w="med" len="med"/>
+                    </a:lnL>
+                    <a:lnR w="12700" cap="flat" cmpd="sng" algn="ctr">
+                      <a:solidFill>
+                        <a:schemeClr val="tx1"/>
+                      </a:solidFill>
+                      <a:prstDash val="solid"/>
+                      <a:round/>
+                      <a:headEnd type="none" w="med" len="med"/>
+                      <a:tailEnd type="none" w="med" len="med"/>
+                    </a:lnR>
+                    <a:lnB w="12700" cap="flat" cmpd="sng" algn="ctr">
+                      <a:solidFill>
+                        <a:schemeClr val="tx1"/>
+                      </a:solidFill>
+                      <a:prstDash val="solid"/>
+                      <a:round/>
+                      <a:headEnd type="none" w="med" len="med"/>
+                      <a:tailEnd type="none" w="med" len="med"/>
+                    </a:lnB>
+                    <a:noFill/>
+                  </a:tcPr>
+                </a:tc>
+                <a:tc>
+                  <a:txBody>
+                    <a:bodyPr/>
+                    <a:lstStyle/>
+                    <a:p>
+                      <a:pPr marL="0" algn="ctr" defTabSz="685800" rtl="0" eaLnBrk="1" latinLnBrk="0" hangingPunct="1"/>
+                      <a:r>
+                        <a:rPr lang="en-US" sz="1350" b="0" kern="1200" dirty="0">
+                          <a:solidFill>
+                            <a:schemeClr val="dk1"/>
+                          </a:solidFill>
+                          <a:latin typeface="+mn-lt"/>
+                          <a:ea typeface="+mn-ea"/>
+                          <a:cs typeface="+mn-cs"/>
+                        </a:rPr>
                         <a:t>$ 0.50</a:t>
                       </a:r>
                     </a:p>
@@ -10109,6 +10166,58 @@
                       <a:pPr algn="ctr"/>
                       <a:r>
                         <a:rPr lang="en-US" dirty="0"/>
+                        <a:t>$4.18</a:t>
+                      </a:r>
+                    </a:p>
+                  </a:txBody>
+                  <a:tcPr>
+                    <a:lnL w="12700" cap="flat" cmpd="sng" algn="ctr">
+                      <a:solidFill>
+                        <a:schemeClr val="tx1"/>
+                      </a:solidFill>
+                      <a:prstDash val="solid"/>
+                      <a:round/>
+                      <a:headEnd type="none" w="med" len="med"/>
+                      <a:tailEnd type="none" w="med" len="med"/>
+                    </a:lnL>
+                    <a:lnR w="12700" cap="flat" cmpd="sng" algn="ctr">
+                      <a:solidFill>
+                        <a:schemeClr val="tx1"/>
+                      </a:solidFill>
+                      <a:prstDash val="solid"/>
+                      <a:round/>
+                      <a:headEnd type="none" w="med" len="med"/>
+                      <a:tailEnd type="none" w="med" len="med"/>
+                    </a:lnR>
+                    <a:lnT w="12700" cap="flat" cmpd="sng" algn="ctr">
+                      <a:solidFill>
+                        <a:schemeClr val="tx1"/>
+                      </a:solidFill>
+                      <a:prstDash val="solid"/>
+                      <a:round/>
+                      <a:headEnd type="none" w="med" len="med"/>
+                      <a:tailEnd type="none" w="med" len="med"/>
+                    </a:lnT>
+                    <a:lnB w="12700" cap="flat" cmpd="sng" algn="ctr">
+                      <a:solidFill>
+                        <a:schemeClr val="tx1"/>
+                      </a:solidFill>
+                      <a:prstDash val="solid"/>
+                      <a:round/>
+                      <a:headEnd type="none" w="med" len="med"/>
+                      <a:tailEnd type="none" w="med" len="med"/>
+                    </a:lnB>
+                    <a:noFill/>
+                  </a:tcPr>
+                </a:tc>
+                <a:tc>
+                  <a:txBody>
+                    <a:bodyPr/>
+                    <a:lstStyle/>
+                    <a:p>
+                      <a:pPr algn="ctr"/>
+                      <a:r>
+                        <a:rPr lang="en-US" dirty="0"/>
                         <a:t>$ 3.83</a:t>
                       </a:r>
                     </a:p>
@@ -10434,7 +10543,50 @@
                       <a:pPr algn="ctr"/>
                       <a:r>
                         <a:rPr lang="en-US" dirty="0"/>
-                        <a:t>Exercise</a:t>
+                        <a:t>Continue</a:t>
+                      </a:r>
+                    </a:p>
+                  </a:txBody>
+                  <a:tcPr>
+                    <a:lnL w="12700" cap="flat" cmpd="sng" algn="ctr">
+                      <a:solidFill>
+                        <a:schemeClr val="tx1"/>
+                      </a:solidFill>
+                      <a:prstDash val="solid"/>
+                      <a:round/>
+                      <a:headEnd type="none" w="med" len="med"/>
+                      <a:tailEnd type="none" w="med" len="med"/>
+                    </a:lnL>
+                    <a:lnR w="12700" cap="flat" cmpd="sng" algn="ctr">
+                      <a:solidFill>
+                        <a:schemeClr val="tx1"/>
+                      </a:solidFill>
+                      <a:prstDash val="solid"/>
+                      <a:round/>
+                      <a:headEnd type="none" w="med" len="med"/>
+                      <a:tailEnd type="none" w="med" len="med"/>
+                    </a:lnR>
+                    <a:lnT w="12700" cap="flat" cmpd="sng" algn="ctr">
+                      <a:solidFill>
+                        <a:schemeClr val="tx1"/>
+                      </a:solidFill>
+                      <a:prstDash val="solid"/>
+                      <a:round/>
+                      <a:headEnd type="none" w="med" len="med"/>
+                      <a:tailEnd type="none" w="med" len="med"/>
+                    </a:lnT>
+                    <a:noFill/>
+                  </a:tcPr>
+                </a:tc>
+                <a:tc>
+                  <a:txBody>
+                    <a:bodyPr/>
+                    <a:lstStyle/>
+                    <a:p>
+                      <a:pPr algn="ctr"/>
+                      <a:r>
+                        <a:rPr lang="en-US" dirty="0"/>
+                        <a:t>Stop</a:t>
                       </a:r>
                     </a:p>
                   </a:txBody>
@@ -10654,7 +10806,7 @@
           <p:nvPr>
             <p:extLst>
               <p:ext uri="{D42A27DB-BD31-4B8C-83A1-F6EECF244321}">
-                <p14:modId xmlns:p14="http://schemas.microsoft.com/office/powerpoint/2010/main" val="3824105136"/>
+                <p14:modId xmlns:p14="http://schemas.microsoft.com/office/powerpoint/2010/main" val="3938270142"/>
               </p:ext>
             </p:extLst>
           </p:nvPr>
@@ -10670,35 +10822,42 @@
                 <a:tableStyleId>{5C22544A-7EE6-4342-B048-85BDC9FD1C3A}</a:tableStyleId>
               </a:tblPr>
               <a:tblGrid>
-                <a:gridCol w="1700784">
+                <a:gridCol w="1417320">
                   <a:extLst>
                     <a:ext uri="{9D8B030D-6E8A-4147-A177-3AD203B41FA5}">
                       <a16:colId xmlns:a16="http://schemas.microsoft.com/office/drawing/2014/main" val="2812415835"/>
                     </a:ext>
                   </a:extLst>
                 </a:gridCol>
-                <a:gridCol w="1700784">
+                <a:gridCol w="1417320">
+                  <a:extLst>
+                    <a:ext uri="{9D8B030D-6E8A-4147-A177-3AD203B41FA5}">
+                      <a16:colId xmlns:a16="http://schemas.microsoft.com/office/drawing/2014/main" val="2946370179"/>
+                    </a:ext>
+                  </a:extLst>
+                </a:gridCol>
+                <a:gridCol w="1417320">
                   <a:extLst>
                     <a:ext uri="{9D8B030D-6E8A-4147-A177-3AD203B41FA5}">
                       <a16:colId xmlns:a16="http://schemas.microsoft.com/office/drawing/2014/main" val="1597612126"/>
                     </a:ext>
                   </a:extLst>
                 </a:gridCol>
-                <a:gridCol w="1700784">
+                <a:gridCol w="1417320">
                   <a:extLst>
                     <a:ext uri="{9D8B030D-6E8A-4147-A177-3AD203B41FA5}">
                       <a16:colId xmlns:a16="http://schemas.microsoft.com/office/drawing/2014/main" val="1570262287"/>
                     </a:ext>
                   </a:extLst>
                 </a:gridCol>
-                <a:gridCol w="1700784">
+                <a:gridCol w="1417320">
                   <a:extLst>
                     <a:ext uri="{9D8B030D-6E8A-4147-A177-3AD203B41FA5}">
                       <a16:colId xmlns:a16="http://schemas.microsoft.com/office/drawing/2014/main" val="4014363287"/>
                     </a:ext>
                   </a:extLst>
                 </a:gridCol>
-                <a:gridCol w="1700784">
+                <a:gridCol w="1417320">
                   <a:extLst>
                     <a:ext uri="{9D8B030D-6E8A-4147-A177-3AD203B41FA5}">
                       <a16:colId xmlns:a16="http://schemas.microsoft.com/office/drawing/2014/main" val="489630985"/>
@@ -10763,7 +10922,7 @@
                           <a:ea typeface="+mn-ea"/>
                           <a:cs typeface="+mn-cs"/>
                         </a:rPr>
-                        <a:t>?</a:t>
+                        <a:t>$ 0</a:t>
                       </a:r>
                     </a:p>
                   </a:txBody>
@@ -10927,6 +11086,56 @@
                       <a:headEnd type="none" w="med" len="med"/>
                       <a:tailEnd type="none" w="med" len="med"/>
                     </a:lnL>
+                    <a:lnR w="12700" cap="flat" cmpd="sng" algn="ctr">
+                      <a:solidFill>
+                        <a:schemeClr val="tx1"/>
+                      </a:solidFill>
+                      <a:prstDash val="solid"/>
+                      <a:round/>
+                      <a:headEnd type="none" w="med" len="med"/>
+                      <a:tailEnd type="none" w="med" len="med"/>
+                    </a:lnR>
+                    <a:lnB w="12700" cap="flat" cmpd="sng" algn="ctr">
+                      <a:solidFill>
+                        <a:schemeClr val="tx1"/>
+                      </a:solidFill>
+                      <a:prstDash val="solid"/>
+                      <a:round/>
+                      <a:headEnd type="none" w="med" len="med"/>
+                      <a:tailEnd type="none" w="med" len="med"/>
+                    </a:lnB>
+                    <a:noFill/>
+                  </a:tcPr>
+                </a:tc>
+                <a:tc>
+                  <a:txBody>
+                    <a:bodyPr/>
+                    <a:lstStyle/>
+                    <a:p>
+                      <a:pPr marL="0" algn="ctr" defTabSz="685800" rtl="0" eaLnBrk="1" latinLnBrk="0" hangingPunct="1"/>
+                      <a:r>
+                        <a:rPr lang="en-US" sz="1350" b="0" kern="1200" dirty="0">
+                          <a:solidFill>
+                            <a:schemeClr val="dk1"/>
+                          </a:solidFill>
+                          <a:latin typeface="+mn-lt"/>
+                          <a:ea typeface="+mn-ea"/>
+                          <a:cs typeface="+mn-cs"/>
+                        </a:rPr>
+                        <a:t>?</a:t>
+                      </a:r>
+                    </a:p>
+                  </a:txBody>
+                  <a:tcPr>
+                    <a:lnL w="12700" cap="flat" cmpd="sng" algn="ctr">
+                      <a:solidFill>
+                        <a:schemeClr val="tx1"/>
+                      </a:solidFill>
+                      <a:prstDash val="solid"/>
+                      <a:round/>
+                      <a:headEnd type="none" w="med" len="med"/>
+                      <a:tailEnd type="none" w="med" len="med"/>
+                    </a:lnL>
                     <a:lnB w="12700" cap="flat" cmpd="sng" algn="ctr">
                       <a:solidFill>
                         <a:schemeClr val="tx1"/>
@@ -10953,11 +11162,63 @@
                     <a:p>
                       <a:r>
                         <a:rPr lang="en-US" dirty="0"/>
-                        <a:t>Q-Value (LSPI)</a:t>
+                        <a:t>Q-Value (DQL)</a:t>
                       </a:r>
                     </a:p>
                   </a:txBody>
                   <a:tcPr>
+                    <a:lnR w="12700" cap="flat" cmpd="sng" algn="ctr">
+                      <a:solidFill>
+                        <a:schemeClr val="tx1"/>
+                      </a:solidFill>
+                      <a:prstDash val="solid"/>
+                      <a:round/>
+                      <a:headEnd type="none" w="med" len="med"/>
+                      <a:tailEnd type="none" w="med" len="med"/>
+                    </a:lnR>
+                    <a:lnT w="12700" cap="flat" cmpd="sng" algn="ctr">
+                      <a:solidFill>
+                        <a:schemeClr val="tx1"/>
+                      </a:solidFill>
+                      <a:prstDash val="solid"/>
+                      <a:round/>
+                      <a:headEnd type="none" w="med" len="med"/>
+                      <a:tailEnd type="none" w="med" len="med"/>
+                    </a:lnT>
+                    <a:lnB w="12700" cap="flat" cmpd="sng" algn="ctr">
+                      <a:solidFill>
+                        <a:schemeClr val="tx1"/>
+                      </a:solidFill>
+                      <a:prstDash val="solid"/>
+                      <a:round/>
+                      <a:headEnd type="none" w="med" len="med"/>
+                      <a:tailEnd type="none" w="med" len="med"/>
+                    </a:lnB>
+                    <a:noFill/>
+                  </a:tcPr>
+                </a:tc>
+                <a:tc>
+                  <a:txBody>
+                    <a:bodyPr/>
+                    <a:lstStyle/>
+                    <a:p>
+                      <a:pPr algn="ctr"/>
+                      <a:r>
+                        <a:rPr lang="en-US" dirty="0"/>
+                        <a:t>$ 3.56</a:t>
+                      </a:r>
+                    </a:p>
+                  </a:txBody>
+                  <a:tcPr>
+                    <a:lnL w="12700" cap="flat" cmpd="sng" algn="ctr">
+                      <a:solidFill>
+                        <a:schemeClr val="tx1"/>
+                      </a:solidFill>
+                      <a:prstDash val="solid"/>
+                      <a:round/>
+                      <a:headEnd type="none" w="med" len="med"/>
+                      <a:tailEnd type="none" w="med" len="med"/>
+                    </a:lnL>
                     <a:lnR w="12700" cap="flat" cmpd="sng" algn="ctr">
                       <a:solidFill>
                         <a:schemeClr val="tx1"/>
@@ -11206,6 +11467,49 @@
                     </a:p>
                   </a:txBody>
                   <a:tcPr>
+                    <a:lnR w="12700" cap="flat" cmpd="sng" algn="ctr">
+                      <a:solidFill>
+                        <a:schemeClr val="tx1"/>
+                      </a:solidFill>
+                      <a:prstDash val="solid"/>
+                      <a:round/>
+                      <a:headEnd type="none" w="med" len="med"/>
+                      <a:tailEnd type="none" w="med" len="med"/>
+                    </a:lnR>
+                    <a:lnT w="12700" cap="flat" cmpd="sng" algn="ctr">
+                      <a:solidFill>
+                        <a:schemeClr val="tx1"/>
+                      </a:solidFill>
+                      <a:prstDash val="solid"/>
+                      <a:round/>
+                      <a:headEnd type="none" w="med" len="med"/>
+                      <a:tailEnd type="none" w="med" len="med"/>
+                    </a:lnT>
+                    <a:noFill/>
+                  </a:tcPr>
+                </a:tc>
+                <a:tc>
+                  <a:txBody>
+                    <a:bodyPr/>
+                    <a:lstStyle/>
+                    <a:p>
+                      <a:pPr algn="ctr"/>
+                      <a:r>
+                        <a:rPr lang="en-US" dirty="0"/>
+                        <a:t>Continue</a:t>
+                      </a:r>
+                    </a:p>
+                  </a:txBody>
+                  <a:tcPr>
+                    <a:lnL w="12700" cap="flat" cmpd="sng" algn="ctr">
+                      <a:solidFill>
+                        <a:schemeClr val="tx1"/>
+                      </a:solidFill>
+                      <a:prstDash val="solid"/>
+                      <a:round/>
+                      <a:headEnd type="none" w="med" len="med"/>
+                      <a:tailEnd type="none" w="med" len="med"/>
+                    </a:lnL>
                     <a:lnR w="12700" cap="flat" cmpd="sng" algn="ctr">
                       <a:solidFill>
                         <a:schemeClr val="tx1"/>
@@ -11541,7 +11845,7 @@
           <p:nvPr>
             <p:extLst>
               <p:ext uri="{D42A27DB-BD31-4B8C-83A1-F6EECF244321}">
-                <p14:modId xmlns:p14="http://schemas.microsoft.com/office/powerpoint/2010/main" val="3133822861"/>
+                <p14:modId xmlns:p14="http://schemas.microsoft.com/office/powerpoint/2010/main" val="309628116"/>
               </p:ext>
             </p:extLst>
           </p:nvPr>
@@ -11557,35 +11861,42 @@
                 <a:tableStyleId>{5C22544A-7EE6-4342-B048-85BDC9FD1C3A}</a:tableStyleId>
               </a:tblPr>
               <a:tblGrid>
-                <a:gridCol w="1700784">
+                <a:gridCol w="1417320">
                   <a:extLst>
                     <a:ext uri="{9D8B030D-6E8A-4147-A177-3AD203B41FA5}">
                       <a16:colId xmlns:a16="http://schemas.microsoft.com/office/drawing/2014/main" val="2812415835"/>
                     </a:ext>
                   </a:extLst>
                 </a:gridCol>
-                <a:gridCol w="1700784">
+                <a:gridCol w="1417320">
+                  <a:extLst>
+                    <a:ext uri="{9D8B030D-6E8A-4147-A177-3AD203B41FA5}">
+                      <a16:colId xmlns:a16="http://schemas.microsoft.com/office/drawing/2014/main" val="1710866062"/>
+                    </a:ext>
+                  </a:extLst>
+                </a:gridCol>
+                <a:gridCol w="1417320">
                   <a:extLst>
                     <a:ext uri="{9D8B030D-6E8A-4147-A177-3AD203B41FA5}">
                       <a16:colId xmlns:a16="http://schemas.microsoft.com/office/drawing/2014/main" val="1597612126"/>
                     </a:ext>
                   </a:extLst>
                 </a:gridCol>
-                <a:gridCol w="1700784">
+                <a:gridCol w="1417320">
                   <a:extLst>
                     <a:ext uri="{9D8B030D-6E8A-4147-A177-3AD203B41FA5}">
                       <a16:colId xmlns:a16="http://schemas.microsoft.com/office/drawing/2014/main" val="1570262287"/>
                     </a:ext>
                   </a:extLst>
                 </a:gridCol>
-                <a:gridCol w="1700784">
+                <a:gridCol w="1417320">
                   <a:extLst>
                     <a:ext uri="{9D8B030D-6E8A-4147-A177-3AD203B41FA5}">
                       <a16:colId xmlns:a16="http://schemas.microsoft.com/office/drawing/2014/main" val="4014363287"/>
                     </a:ext>
                   </a:extLst>
                 </a:gridCol>
-                <a:gridCol w="1700784">
+                <a:gridCol w="1417320">
                   <a:extLst>
                     <a:ext uri="{9D8B030D-6E8A-4147-A177-3AD203B41FA5}">
                       <a16:colId xmlns:a16="http://schemas.microsoft.com/office/drawing/2014/main" val="489630985"/>
@@ -11650,6 +11961,56 @@
                           <a:ea typeface="+mn-ea"/>
                           <a:cs typeface="+mn-cs"/>
                         </a:rPr>
+                        <a:t>$ 0</a:t>
+                      </a:r>
+                    </a:p>
+                  </a:txBody>
+                  <a:tcPr>
+                    <a:lnL w="12700" cap="flat" cmpd="sng" algn="ctr">
+                      <a:solidFill>
+                        <a:schemeClr val="tx1"/>
+                      </a:solidFill>
+                      <a:prstDash val="solid"/>
+                      <a:round/>
+                      <a:headEnd type="none" w="med" len="med"/>
+                      <a:tailEnd type="none" w="med" len="med"/>
+                    </a:lnL>
+                    <a:lnR w="12700" cap="flat" cmpd="sng" algn="ctr">
+                      <a:solidFill>
+                        <a:schemeClr val="tx1"/>
+                      </a:solidFill>
+                      <a:prstDash val="solid"/>
+                      <a:round/>
+                      <a:headEnd type="none" w="med" len="med"/>
+                      <a:tailEnd type="none" w="med" len="med"/>
+                    </a:lnR>
+                    <a:lnB w="12700" cap="flat" cmpd="sng" algn="ctr">
+                      <a:solidFill>
+                        <a:schemeClr val="tx1"/>
+                      </a:solidFill>
+                      <a:prstDash val="solid"/>
+                      <a:round/>
+                      <a:headEnd type="none" w="med" len="med"/>
+                      <a:tailEnd type="none" w="med" len="med"/>
+                    </a:lnB>
+                    <a:noFill/>
+                  </a:tcPr>
+                </a:tc>
+                <a:tc>
+                  <a:txBody>
+                    <a:bodyPr/>
+                    <a:lstStyle/>
+                    <a:p>
+                      <a:pPr marL="0" algn="ctr" defTabSz="685800" rtl="0" eaLnBrk="1" latinLnBrk="0" hangingPunct="1"/>
+                      <a:r>
+                        <a:rPr lang="en-US" sz="1350" b="0" kern="1200" dirty="0">
+                          <a:solidFill>
+                            <a:schemeClr val="dk1"/>
+                          </a:solidFill>
+                          <a:latin typeface="+mn-lt"/>
+                          <a:ea typeface="+mn-ea"/>
+                          <a:cs typeface="+mn-cs"/>
+                        </a:rPr>
                         <a:t>$ 13.00</a:t>
                       </a:r>
                     </a:p>
@@ -11840,11 +12201,63 @@
                     <a:p>
                       <a:r>
                         <a:rPr lang="en-US" dirty="0"/>
-                        <a:t>Q-Value (LSPI)</a:t>
+                        <a:t>Q-Value (DQL)</a:t>
                       </a:r>
                     </a:p>
                   </a:txBody>
                   <a:tcPr>
+                    <a:lnR w="12700" cap="flat" cmpd="sng" algn="ctr">
+                      <a:solidFill>
+                        <a:schemeClr val="tx1"/>
+                      </a:solidFill>
+                      <a:prstDash val="solid"/>
+                      <a:round/>
+                      <a:headEnd type="none" w="med" len="med"/>
+                      <a:tailEnd type="none" w="med" len="med"/>
+                    </a:lnR>
+                    <a:lnT w="12700" cap="flat" cmpd="sng" algn="ctr">
+                      <a:solidFill>
+                        <a:schemeClr val="tx1"/>
+                      </a:solidFill>
+                      <a:prstDash val="solid"/>
+                      <a:round/>
+                      <a:headEnd type="none" w="med" len="med"/>
+                      <a:tailEnd type="none" w="med" len="med"/>
+                    </a:lnT>
+                    <a:lnB w="12700" cap="flat" cmpd="sng" algn="ctr">
+                      <a:solidFill>
+                        <a:schemeClr val="tx1"/>
+                      </a:solidFill>
+                      <a:prstDash val="solid"/>
+                      <a:round/>
+                      <a:headEnd type="none" w="med" len="med"/>
+                      <a:tailEnd type="none" w="med" len="med"/>
+                    </a:lnB>
+                    <a:noFill/>
+                  </a:tcPr>
+                </a:tc>
+                <a:tc>
+                  <a:txBody>
+                    <a:bodyPr/>
+                    <a:lstStyle/>
+                    <a:p>
+                      <a:pPr algn="ctr"/>
+                      <a:r>
+                        <a:rPr lang="en-US" dirty="0"/>
+                        <a:t>$ 3.56</a:t>
+                      </a:r>
+                    </a:p>
+                  </a:txBody>
+                  <a:tcPr>
+                    <a:lnL w="12700" cap="flat" cmpd="sng" algn="ctr">
+                      <a:solidFill>
+                        <a:schemeClr val="tx1"/>
+                      </a:solidFill>
+                      <a:prstDash val="solid"/>
+                      <a:round/>
+                      <a:headEnd type="none" w="med" len="med"/>
+                      <a:tailEnd type="none" w="med" len="med"/>
+                    </a:lnL>
                     <a:lnR w="12700" cap="flat" cmpd="sng" algn="ctr">
                       <a:solidFill>
                         <a:schemeClr val="tx1"/>
@@ -12093,6 +12506,49 @@
                     </a:p>
                   </a:txBody>
                   <a:tcPr>
+                    <a:lnR w="12700" cap="flat" cmpd="sng" algn="ctr">
+                      <a:solidFill>
+                        <a:schemeClr val="tx1"/>
+                      </a:solidFill>
+                      <a:prstDash val="solid"/>
+                      <a:round/>
+                      <a:headEnd type="none" w="med" len="med"/>
+                      <a:tailEnd type="none" w="med" len="med"/>
+                    </a:lnR>
+                    <a:lnT w="12700" cap="flat" cmpd="sng" algn="ctr">
+                      <a:solidFill>
+                        <a:schemeClr val="tx1"/>
+                      </a:solidFill>
+                      <a:prstDash val="solid"/>
+                      <a:round/>
+                      <a:headEnd type="none" w="med" len="med"/>
+                      <a:tailEnd type="none" w="med" len="med"/>
+                    </a:lnT>
+                    <a:noFill/>
+                  </a:tcPr>
+                </a:tc>
+                <a:tc>
+                  <a:txBody>
+                    <a:bodyPr/>
+                    <a:lstStyle/>
+                    <a:p>
+                      <a:pPr algn="ctr"/>
+                      <a:r>
+                        <a:rPr lang="en-US" dirty="0"/>
+                        <a:t>Continue</a:t>
+                      </a:r>
+                    </a:p>
+                  </a:txBody>
+                  <a:tcPr>
+                    <a:lnL w="12700" cap="flat" cmpd="sng" algn="ctr">
+                      <a:solidFill>
+                        <a:schemeClr val="tx1"/>
+                      </a:solidFill>
+                      <a:prstDash val="solid"/>
+                      <a:round/>
+                      <a:headEnd type="none" w="med" len="med"/>
+                      <a:tailEnd type="none" w="med" len="med"/>
+                    </a:lnL>
                     <a:lnR w="12700" cap="flat" cmpd="sng" algn="ctr">
                       <a:solidFill>
                         <a:schemeClr val="tx1"/>
@@ -12317,6 +12773,40 @@
           </a:prstGeom>
         </p:spPr>
       </p:pic>
+      <p:sp>
+        <p:nvSpPr>
+          <p:cNvPr id="4" name="TextBox 3">
+            <a:extLst>
+              <a:ext uri="{FF2B5EF4-FFF2-40B4-BE49-F238E27FC236}">
+                <a16:creationId xmlns:a16="http://schemas.microsoft.com/office/drawing/2014/main" id="{D7967BE6-D4A0-D218-7C3C-69F32115C056}"/>
+              </a:ext>
+            </a:extLst>
+          </p:cNvPr>
+          <p:cNvSpPr txBox="1"/>
+          <p:nvPr/>
+        </p:nvSpPr>
+        <p:spPr>
+          <a:xfrm>
+            <a:off x="7903597" y="1414581"/>
+            <a:ext cx="848802" cy="178425"/>
+          </a:xfrm>
+          <a:prstGeom prst="rect">
+            <a:avLst/>
+          </a:prstGeom>
+          <a:solidFill>
+            <a:schemeClr val="bg1"/>
+          </a:solidFill>
+        </p:spPr>
+        <p:txBody>
+          <a:bodyPr wrap="square" rtlCol="0">
+            <a:spAutoFit/>
+          </a:bodyPr>
+          <a:lstStyle/>
+          <a:p>
+            <a:endParaRPr lang="en-GB" dirty="0"/>
+          </a:p>
+        </p:txBody>
+      </p:sp>
     </p:spTree>
     <p:extLst>
       <p:ext uri="{BB962C8B-B14F-4D97-AF65-F5344CB8AC3E}">
@@ -12428,7 +12918,7 @@
           <p:nvPr>
             <p:extLst>
               <p:ext uri="{D42A27DB-BD31-4B8C-83A1-F6EECF244321}">
-                <p14:modId xmlns:p14="http://schemas.microsoft.com/office/powerpoint/2010/main" val="1112165417"/>
+                <p14:modId xmlns:p14="http://schemas.microsoft.com/office/powerpoint/2010/main" val="2011806385"/>
               </p:ext>
             </p:extLst>
           </p:nvPr>
@@ -12444,35 +12934,42 @@
                 <a:tableStyleId>{5C22544A-7EE6-4342-B048-85BDC9FD1C3A}</a:tableStyleId>
               </a:tblPr>
               <a:tblGrid>
-                <a:gridCol w="1700784">
+                <a:gridCol w="1417320">
                   <a:extLst>
                     <a:ext uri="{9D8B030D-6E8A-4147-A177-3AD203B41FA5}">
                       <a16:colId xmlns:a16="http://schemas.microsoft.com/office/drawing/2014/main" val="2812415835"/>
                     </a:ext>
                   </a:extLst>
                 </a:gridCol>
-                <a:gridCol w="1700784">
+                <a:gridCol w="1417320">
+                  <a:extLst>
+                    <a:ext uri="{9D8B030D-6E8A-4147-A177-3AD203B41FA5}">
+                      <a16:colId xmlns:a16="http://schemas.microsoft.com/office/drawing/2014/main" val="3009988448"/>
+                    </a:ext>
+                  </a:extLst>
+                </a:gridCol>
+                <a:gridCol w="1417320">
                   <a:extLst>
                     <a:ext uri="{9D8B030D-6E8A-4147-A177-3AD203B41FA5}">
                       <a16:colId xmlns:a16="http://schemas.microsoft.com/office/drawing/2014/main" val="1597612126"/>
                     </a:ext>
                   </a:extLst>
                 </a:gridCol>
-                <a:gridCol w="1700784">
+                <a:gridCol w="1417320">
                   <a:extLst>
                     <a:ext uri="{9D8B030D-6E8A-4147-A177-3AD203B41FA5}">
                       <a16:colId xmlns:a16="http://schemas.microsoft.com/office/drawing/2014/main" val="1570262287"/>
                     </a:ext>
                   </a:extLst>
                 </a:gridCol>
-                <a:gridCol w="1700784">
+                <a:gridCol w="1417320">
                   <a:extLst>
                     <a:ext uri="{9D8B030D-6E8A-4147-A177-3AD203B41FA5}">
                       <a16:colId xmlns:a16="http://schemas.microsoft.com/office/drawing/2014/main" val="4014363287"/>
                     </a:ext>
                   </a:extLst>
                 </a:gridCol>
-                <a:gridCol w="1700784">
+                <a:gridCol w="1417320">
                   <a:extLst>
                     <a:ext uri="{9D8B030D-6E8A-4147-A177-3AD203B41FA5}">
                       <a16:colId xmlns:a16="http://schemas.microsoft.com/office/drawing/2014/main" val="489630985"/>
@@ -12537,6 +13034,56 @@
                           <a:ea typeface="+mn-ea"/>
                           <a:cs typeface="+mn-cs"/>
                         </a:rPr>
+                        <a:t>$ 0</a:t>
+                      </a:r>
+                    </a:p>
+                  </a:txBody>
+                  <a:tcPr>
+                    <a:lnL w="12700" cap="flat" cmpd="sng" algn="ctr">
+                      <a:solidFill>
+                        <a:schemeClr val="tx1"/>
+                      </a:solidFill>
+                      <a:prstDash val="solid"/>
+                      <a:round/>
+                      <a:headEnd type="none" w="med" len="med"/>
+                      <a:tailEnd type="none" w="med" len="med"/>
+                    </a:lnL>
+                    <a:lnR w="12700" cap="flat" cmpd="sng" algn="ctr">
+                      <a:solidFill>
+                        <a:schemeClr val="tx1"/>
+                      </a:solidFill>
+                      <a:prstDash val="solid"/>
+                      <a:round/>
+                      <a:headEnd type="none" w="med" len="med"/>
+                      <a:tailEnd type="none" w="med" len="med"/>
+                    </a:lnR>
+                    <a:lnB w="12700" cap="flat" cmpd="sng" algn="ctr">
+                      <a:solidFill>
+                        <a:schemeClr val="tx1"/>
+                      </a:solidFill>
+                      <a:prstDash val="solid"/>
+                      <a:round/>
+                      <a:headEnd type="none" w="med" len="med"/>
+                      <a:tailEnd type="none" w="med" len="med"/>
+                    </a:lnB>
+                    <a:noFill/>
+                  </a:tcPr>
+                </a:tc>
+                <a:tc>
+                  <a:txBody>
+                    <a:bodyPr/>
+                    <a:lstStyle/>
+                    <a:p>
+                      <a:pPr marL="0" algn="ctr" defTabSz="685800" rtl="0" eaLnBrk="1" latinLnBrk="0" hangingPunct="1"/>
+                      <a:r>
+                        <a:rPr lang="en-US" sz="1350" b="0" kern="1200" dirty="0">
+                          <a:solidFill>
+                            <a:schemeClr val="dk1"/>
+                          </a:solidFill>
+                          <a:latin typeface="+mn-lt"/>
+                          <a:ea typeface="+mn-ea"/>
+                          <a:cs typeface="+mn-cs"/>
+                        </a:rPr>
                         <a:t>$ 13.00</a:t>
                       </a:r>
                     </a:p>
@@ -12727,11 +13274,63 @@
                     <a:p>
                       <a:r>
                         <a:rPr lang="en-US" dirty="0"/>
-                        <a:t>Q-Value (LSPI)</a:t>
+                        <a:t>Q-Value (DQL)</a:t>
                       </a:r>
                     </a:p>
                   </a:txBody>
                   <a:tcPr>
+                    <a:lnR w="12700" cap="flat" cmpd="sng" algn="ctr">
+                      <a:solidFill>
+                        <a:schemeClr val="tx1"/>
+                      </a:solidFill>
+                      <a:prstDash val="solid"/>
+                      <a:round/>
+                      <a:headEnd type="none" w="med" len="med"/>
+                      <a:tailEnd type="none" w="med" len="med"/>
+                    </a:lnR>
+                    <a:lnT w="12700" cap="flat" cmpd="sng" algn="ctr">
+                      <a:solidFill>
+                        <a:schemeClr val="tx1"/>
+                      </a:solidFill>
+                      <a:prstDash val="solid"/>
+                      <a:round/>
+                      <a:headEnd type="none" w="med" len="med"/>
+                      <a:tailEnd type="none" w="med" len="med"/>
+                    </a:lnT>
+                    <a:lnB w="12700" cap="flat" cmpd="sng" algn="ctr">
+                      <a:solidFill>
+                        <a:schemeClr val="tx1"/>
+                      </a:solidFill>
+                      <a:prstDash val="solid"/>
+                      <a:round/>
+                      <a:headEnd type="none" w="med" len="med"/>
+                      <a:tailEnd type="none" w="med" len="med"/>
+                    </a:lnB>
+                    <a:noFill/>
+                  </a:tcPr>
+                </a:tc>
+                <a:tc>
+                  <a:txBody>
+                    <a:bodyPr/>
+                    <a:lstStyle/>
+                    <a:p>
+                      <a:pPr algn="ctr"/>
+                      <a:r>
+                        <a:rPr lang="en-US" dirty="0"/>
+                        <a:t>$ 3.56</a:t>
+                      </a:r>
+                    </a:p>
+                  </a:txBody>
+                  <a:tcPr>
+                    <a:lnL w="12700" cap="flat" cmpd="sng" algn="ctr">
+                      <a:solidFill>
+                        <a:schemeClr val="tx1"/>
+                      </a:solidFill>
+                      <a:prstDash val="solid"/>
+                      <a:round/>
+                      <a:headEnd type="none" w="med" len="med"/>
+                      <a:tailEnd type="none" w="med" len="med"/>
+                    </a:lnL>
                     <a:lnR w="12700" cap="flat" cmpd="sng" algn="ctr">
                       <a:solidFill>
                         <a:schemeClr val="tx1"/>
@@ -13009,7 +13608,7 @@
                       <a:pPr algn="ctr"/>
                       <a:r>
                         <a:rPr lang="en-US" dirty="0"/>
-                        <a:t>Stop</a:t>
+                        <a:t>Continue</a:t>
                       </a:r>
                     </a:p>
                   </a:txBody>
@@ -13052,7 +13651,50 @@
                       <a:pPr algn="ctr"/>
                       <a:r>
                         <a:rPr lang="en-US" dirty="0"/>
-                        <a:t>Continue</a:t>
+                        <a:t>Stop</a:t>
+                      </a:r>
+                    </a:p>
+                  </a:txBody>
+                  <a:tcPr>
+                    <a:lnL w="12700" cap="flat" cmpd="sng" algn="ctr">
+                      <a:solidFill>
+                        <a:schemeClr val="tx1"/>
+                      </a:solidFill>
+                      <a:prstDash val="solid"/>
+                      <a:round/>
+                      <a:headEnd type="none" w="med" len="med"/>
+                      <a:tailEnd type="none" w="med" len="med"/>
+                    </a:lnL>
+                    <a:lnR w="12700" cap="flat" cmpd="sng" algn="ctr">
+                      <a:solidFill>
+                        <a:schemeClr val="tx1"/>
+                      </a:solidFill>
+                      <a:prstDash val="solid"/>
+                      <a:round/>
+                      <a:headEnd type="none" w="med" len="med"/>
+                      <a:tailEnd type="none" w="med" len="med"/>
+                    </a:lnR>
+                    <a:lnT w="12700" cap="flat" cmpd="sng" algn="ctr">
+                      <a:solidFill>
+                        <a:schemeClr val="tx1"/>
+                      </a:solidFill>
+                      <a:prstDash val="solid"/>
+                      <a:round/>
+                      <a:headEnd type="none" w="med" len="med"/>
+                      <a:tailEnd type="none" w="med" len="med"/>
+                    </a:lnT>
+                    <a:noFill/>
+                  </a:tcPr>
+                </a:tc>
+                <a:tc>
+                  <a:txBody>
+                    <a:bodyPr/>
+                    <a:lstStyle/>
+                    <a:p>
+                      <a:pPr algn="ctr"/>
+                      <a:r>
+                        <a:rPr lang="en-US" dirty="0"/>
+                        <a:t>Stop</a:t>
                       </a:r>
                     </a:p>
                   </a:txBody>
@@ -13204,6 +13846,40 @@
           </a:prstGeom>
         </p:spPr>
       </p:pic>
+      <p:sp>
+        <p:nvSpPr>
+          <p:cNvPr id="4" name="TextBox 3">
+            <a:extLst>
+              <a:ext uri="{FF2B5EF4-FFF2-40B4-BE49-F238E27FC236}">
+                <a16:creationId xmlns:a16="http://schemas.microsoft.com/office/drawing/2014/main" id="{78076B02-F6D7-8396-66F2-3DC5DD06CF8B}"/>
+              </a:ext>
+            </a:extLst>
+          </p:cNvPr>
+          <p:cNvSpPr txBox="1"/>
+          <p:nvPr/>
+        </p:nvSpPr>
+        <p:spPr>
+          <a:xfrm>
+            <a:off x="7903597" y="1414581"/>
+            <a:ext cx="848802" cy="178425"/>
+          </a:xfrm>
+          <a:prstGeom prst="rect">
+            <a:avLst/>
+          </a:prstGeom>
+          <a:solidFill>
+            <a:schemeClr val="bg1"/>
+          </a:solidFill>
+        </p:spPr>
+        <p:txBody>
+          <a:bodyPr wrap="square" rtlCol="0">
+            <a:spAutoFit/>
+          </a:bodyPr>
+          <a:lstStyle/>
+          <a:p>
+            <a:endParaRPr lang="en-GB" dirty="0"/>
+          </a:p>
+        </p:txBody>
+      </p:sp>
     </p:spTree>
     <p:extLst>
       <p:ext uri="{BB962C8B-B14F-4D97-AF65-F5344CB8AC3E}">
@@ -13315,7 +13991,7 @@
           <p:nvPr>
             <p:extLst>
               <p:ext uri="{D42A27DB-BD31-4B8C-83A1-F6EECF244321}">
-                <p14:modId xmlns:p14="http://schemas.microsoft.com/office/powerpoint/2010/main" val="2093518475"/>
+                <p14:modId xmlns:p14="http://schemas.microsoft.com/office/powerpoint/2010/main" val="2982690334"/>
               </p:ext>
             </p:extLst>
           </p:nvPr>
@@ -13331,35 +14007,42 @@
                 <a:tableStyleId>{5C22544A-7EE6-4342-B048-85BDC9FD1C3A}</a:tableStyleId>
               </a:tblPr>
               <a:tblGrid>
-                <a:gridCol w="1700784">
+                <a:gridCol w="1417320">
                   <a:extLst>
                     <a:ext uri="{9D8B030D-6E8A-4147-A177-3AD203B41FA5}">
                       <a16:colId xmlns:a16="http://schemas.microsoft.com/office/drawing/2014/main" val="2812415835"/>
                     </a:ext>
                   </a:extLst>
                 </a:gridCol>
-                <a:gridCol w="1700784">
+                <a:gridCol w="1417320">
+                  <a:extLst>
+                    <a:ext uri="{9D8B030D-6E8A-4147-A177-3AD203B41FA5}">
+                      <a16:colId xmlns:a16="http://schemas.microsoft.com/office/drawing/2014/main" val="2956406135"/>
+                    </a:ext>
+                  </a:extLst>
+                </a:gridCol>
+                <a:gridCol w="1417320">
                   <a:extLst>
                     <a:ext uri="{9D8B030D-6E8A-4147-A177-3AD203B41FA5}">
                       <a16:colId xmlns:a16="http://schemas.microsoft.com/office/drawing/2014/main" val="1597612126"/>
                     </a:ext>
                   </a:extLst>
                 </a:gridCol>
-                <a:gridCol w="1700784">
+                <a:gridCol w="1417320">
                   <a:extLst>
                     <a:ext uri="{9D8B030D-6E8A-4147-A177-3AD203B41FA5}">
                       <a16:colId xmlns:a16="http://schemas.microsoft.com/office/drawing/2014/main" val="1570262287"/>
                     </a:ext>
                   </a:extLst>
                 </a:gridCol>
-                <a:gridCol w="1700784">
+                <a:gridCol w="1417320">
                   <a:extLst>
                     <a:ext uri="{9D8B030D-6E8A-4147-A177-3AD203B41FA5}">
                       <a16:colId xmlns:a16="http://schemas.microsoft.com/office/drawing/2014/main" val="4014363287"/>
                     </a:ext>
                   </a:extLst>
                 </a:gridCol>
-                <a:gridCol w="1700784">
+                <a:gridCol w="1417320">
                   <a:extLst>
                     <a:ext uri="{9D8B030D-6E8A-4147-A177-3AD203B41FA5}">
                       <a16:colId xmlns:a16="http://schemas.microsoft.com/office/drawing/2014/main" val="489630985"/>
@@ -13424,6 +14107,56 @@
                           <a:ea typeface="+mn-ea"/>
                           <a:cs typeface="+mn-cs"/>
                         </a:rPr>
+                        <a:t>$ 0</a:t>
+                      </a:r>
+                    </a:p>
+                  </a:txBody>
+                  <a:tcPr>
+                    <a:lnL w="12700" cap="flat" cmpd="sng" algn="ctr">
+                      <a:solidFill>
+                        <a:schemeClr val="tx1"/>
+                      </a:solidFill>
+                      <a:prstDash val="solid"/>
+                      <a:round/>
+                      <a:headEnd type="none" w="med" len="med"/>
+                      <a:tailEnd type="none" w="med" len="med"/>
+                    </a:lnL>
+                    <a:lnR w="12700" cap="flat" cmpd="sng" algn="ctr">
+                      <a:solidFill>
+                        <a:schemeClr val="tx1"/>
+                      </a:solidFill>
+                      <a:prstDash val="solid"/>
+                      <a:round/>
+                      <a:headEnd type="none" w="med" len="med"/>
+                      <a:tailEnd type="none" w="med" len="med"/>
+                    </a:lnR>
+                    <a:lnB w="12700" cap="flat" cmpd="sng" algn="ctr">
+                      <a:solidFill>
+                        <a:schemeClr val="tx1"/>
+                      </a:solidFill>
+                      <a:prstDash val="solid"/>
+                      <a:round/>
+                      <a:headEnd type="none" w="med" len="med"/>
+                      <a:tailEnd type="none" w="med" len="med"/>
+                    </a:lnB>
+                    <a:noFill/>
+                  </a:tcPr>
+                </a:tc>
+                <a:tc>
+                  <a:txBody>
+                    <a:bodyPr/>
+                    <a:lstStyle/>
+                    <a:p>
+                      <a:pPr marL="0" algn="ctr" defTabSz="685800" rtl="0" eaLnBrk="1" latinLnBrk="0" hangingPunct="1"/>
+                      <a:r>
+                        <a:rPr lang="en-US" sz="1350" b="0" kern="1200" dirty="0">
+                          <a:solidFill>
+                            <a:schemeClr val="dk1"/>
+                          </a:solidFill>
+                          <a:latin typeface="+mn-lt"/>
+                          <a:ea typeface="+mn-ea"/>
+                          <a:cs typeface="+mn-cs"/>
+                        </a:rPr>
                         <a:t>$ 13.00</a:t>
                       </a:r>
                     </a:p>
@@ -13614,11 +14347,63 @@
                     <a:p>
                       <a:r>
                         <a:rPr lang="en-US" dirty="0"/>
-                        <a:t>Q-Value (LSPI)</a:t>
+                        <a:t>Q-Value (DQL)</a:t>
                       </a:r>
                     </a:p>
                   </a:txBody>
                   <a:tcPr>
+                    <a:lnR w="12700" cap="flat" cmpd="sng" algn="ctr">
+                      <a:solidFill>
+                        <a:schemeClr val="tx1"/>
+                      </a:solidFill>
+                      <a:prstDash val="solid"/>
+                      <a:round/>
+                      <a:headEnd type="none" w="med" len="med"/>
+                      <a:tailEnd type="none" w="med" len="med"/>
+                    </a:lnR>
+                    <a:lnT w="12700" cap="flat" cmpd="sng" algn="ctr">
+                      <a:solidFill>
+                        <a:schemeClr val="tx1"/>
+                      </a:solidFill>
+                      <a:prstDash val="solid"/>
+                      <a:round/>
+                      <a:headEnd type="none" w="med" len="med"/>
+                      <a:tailEnd type="none" w="med" len="med"/>
+                    </a:lnT>
+                    <a:lnB w="12700" cap="flat" cmpd="sng" algn="ctr">
+                      <a:solidFill>
+                        <a:schemeClr val="tx1"/>
+                      </a:solidFill>
+                      <a:prstDash val="solid"/>
+                      <a:round/>
+                      <a:headEnd type="none" w="med" len="med"/>
+                      <a:tailEnd type="none" w="med" len="med"/>
+                    </a:lnB>
+                    <a:noFill/>
+                  </a:tcPr>
+                </a:tc>
+                <a:tc>
+                  <a:txBody>
+                    <a:bodyPr/>
+                    <a:lstStyle/>
+                    <a:p>
+                      <a:pPr algn="ctr"/>
+                      <a:r>
+                        <a:rPr lang="en-US" dirty="0"/>
+                        <a:t>$ 3.56</a:t>
+                      </a:r>
+                    </a:p>
+                  </a:txBody>
+                  <a:tcPr>
+                    <a:lnL w="12700" cap="flat" cmpd="sng" algn="ctr">
+                      <a:solidFill>
+                        <a:schemeClr val="tx1"/>
+                      </a:solidFill>
+                      <a:prstDash val="solid"/>
+                      <a:round/>
+                      <a:headEnd type="none" w="med" len="med"/>
+                      <a:tailEnd type="none" w="med" len="med"/>
+                    </a:lnL>
                     <a:lnR w="12700" cap="flat" cmpd="sng" algn="ctr">
                       <a:solidFill>
                         <a:schemeClr val="tx1"/>
@@ -13896,7 +14681,7 @@
                       <a:pPr algn="ctr"/>
                       <a:r>
                         <a:rPr lang="en-US" dirty="0"/>
-                        <a:t>Stop</a:t>
+                        <a:t>Continue</a:t>
                       </a:r>
                     </a:p>
                   </a:txBody>
@@ -13939,7 +14724,50 @@
                       <a:pPr algn="ctr"/>
                       <a:r>
                         <a:rPr lang="en-US" dirty="0"/>
-                        <a:t>Continue</a:t>
+                        <a:t>Stop</a:t>
+                      </a:r>
+                    </a:p>
+                  </a:txBody>
+                  <a:tcPr>
+                    <a:lnL w="12700" cap="flat" cmpd="sng" algn="ctr">
+                      <a:solidFill>
+                        <a:schemeClr val="tx1"/>
+                      </a:solidFill>
+                      <a:prstDash val="solid"/>
+                      <a:round/>
+                      <a:headEnd type="none" w="med" len="med"/>
+                      <a:tailEnd type="none" w="med" len="med"/>
+                    </a:lnL>
+                    <a:lnR w="12700" cap="flat" cmpd="sng" algn="ctr">
+                      <a:solidFill>
+                        <a:schemeClr val="tx1"/>
+                      </a:solidFill>
+                      <a:prstDash val="solid"/>
+                      <a:round/>
+                      <a:headEnd type="none" w="med" len="med"/>
+                      <a:tailEnd type="none" w="med" len="med"/>
+                    </a:lnR>
+                    <a:lnT w="12700" cap="flat" cmpd="sng" algn="ctr">
+                      <a:solidFill>
+                        <a:schemeClr val="tx1"/>
+                      </a:solidFill>
+                      <a:prstDash val="solid"/>
+                      <a:round/>
+                      <a:headEnd type="none" w="med" len="med"/>
+                      <a:tailEnd type="none" w="med" len="med"/>
+                    </a:lnT>
+                    <a:noFill/>
+                  </a:tcPr>
+                </a:tc>
+                <a:tc>
+                  <a:txBody>
+                    <a:bodyPr/>
+                    <a:lstStyle/>
+                    <a:p>
+                      <a:pPr algn="ctr"/>
+                      <a:r>
+                        <a:rPr lang="en-US" dirty="0"/>
+                        <a:t>Stop</a:t>
                       </a:r>
                     </a:p>
                   </a:txBody>
@@ -14091,6 +14919,40 @@
           </a:prstGeom>
         </p:spPr>
       </p:pic>
+      <p:sp>
+        <p:nvSpPr>
+          <p:cNvPr id="4" name="TextBox 3">
+            <a:extLst>
+              <a:ext uri="{FF2B5EF4-FFF2-40B4-BE49-F238E27FC236}">
+                <a16:creationId xmlns:a16="http://schemas.microsoft.com/office/drawing/2014/main" id="{6D29CF40-CCBA-FF19-CEEC-6070F53AE3C4}"/>
+              </a:ext>
+            </a:extLst>
+          </p:cNvPr>
+          <p:cNvSpPr txBox="1"/>
+          <p:nvPr/>
+        </p:nvSpPr>
+        <p:spPr>
+          <a:xfrm>
+            <a:off x="7903597" y="1414581"/>
+            <a:ext cx="848802" cy="178425"/>
+          </a:xfrm>
+          <a:prstGeom prst="rect">
+            <a:avLst/>
+          </a:prstGeom>
+          <a:solidFill>
+            <a:schemeClr val="bg1"/>
+          </a:solidFill>
+        </p:spPr>
+        <p:txBody>
+          <a:bodyPr wrap="square" rtlCol="0">
+            <a:spAutoFit/>
+          </a:bodyPr>
+          <a:lstStyle/>
+          <a:p>
+            <a:endParaRPr lang="en-GB" dirty="0"/>
+          </a:p>
+        </p:txBody>
+      </p:sp>
     </p:spTree>
     <p:extLst>
       <p:ext uri="{BB962C8B-B14F-4D97-AF65-F5344CB8AC3E}">
@@ -14202,7 +15064,7 @@
           <p:nvPr>
             <p:extLst>
               <p:ext uri="{D42A27DB-BD31-4B8C-83A1-F6EECF244321}">
-                <p14:modId xmlns:p14="http://schemas.microsoft.com/office/powerpoint/2010/main" val="2240663708"/>
+                <p14:modId xmlns:p14="http://schemas.microsoft.com/office/powerpoint/2010/main" val="447171012"/>
               </p:ext>
             </p:extLst>
           </p:nvPr>
@@ -14218,35 +15080,42 @@
                 <a:tableStyleId>{5C22544A-7EE6-4342-B048-85BDC9FD1C3A}</a:tableStyleId>
               </a:tblPr>
               <a:tblGrid>
-                <a:gridCol w="1700784">
+                <a:gridCol w="1417320">
                   <a:extLst>
                     <a:ext uri="{9D8B030D-6E8A-4147-A177-3AD203B41FA5}">
                       <a16:colId xmlns:a16="http://schemas.microsoft.com/office/drawing/2014/main" val="2812415835"/>
                     </a:ext>
                   </a:extLst>
                 </a:gridCol>
-                <a:gridCol w="1700784">
+                <a:gridCol w="1417320">
+                  <a:extLst>
+                    <a:ext uri="{9D8B030D-6E8A-4147-A177-3AD203B41FA5}">
+                      <a16:colId xmlns:a16="http://schemas.microsoft.com/office/drawing/2014/main" val="294568944"/>
+                    </a:ext>
+                  </a:extLst>
+                </a:gridCol>
+                <a:gridCol w="1417320">
                   <a:extLst>
                     <a:ext uri="{9D8B030D-6E8A-4147-A177-3AD203B41FA5}">
                       <a16:colId xmlns:a16="http://schemas.microsoft.com/office/drawing/2014/main" val="1597612126"/>
                     </a:ext>
                   </a:extLst>
                 </a:gridCol>
-                <a:gridCol w="1700784">
+                <a:gridCol w="1417320">
                   <a:extLst>
                     <a:ext uri="{9D8B030D-6E8A-4147-A177-3AD203B41FA5}">
                       <a16:colId xmlns:a16="http://schemas.microsoft.com/office/drawing/2014/main" val="1570262287"/>
                     </a:ext>
                   </a:extLst>
                 </a:gridCol>
-                <a:gridCol w="1700784">
+                <a:gridCol w="1417320">
                   <a:extLst>
                     <a:ext uri="{9D8B030D-6E8A-4147-A177-3AD203B41FA5}">
                       <a16:colId xmlns:a16="http://schemas.microsoft.com/office/drawing/2014/main" val="4014363287"/>
                     </a:ext>
                   </a:extLst>
                 </a:gridCol>
-                <a:gridCol w="1700784">
+                <a:gridCol w="1417320">
                   <a:extLst>
                     <a:ext uri="{9D8B030D-6E8A-4147-A177-3AD203B41FA5}">
                       <a16:colId xmlns:a16="http://schemas.microsoft.com/office/drawing/2014/main" val="489630985"/>
@@ -14311,6 +15180,56 @@
                           <a:ea typeface="+mn-ea"/>
                           <a:cs typeface="+mn-cs"/>
                         </a:rPr>
+                        <a:t>$ 0</a:t>
+                      </a:r>
+                    </a:p>
+                  </a:txBody>
+                  <a:tcPr>
+                    <a:lnL w="12700" cap="flat" cmpd="sng" algn="ctr">
+                      <a:solidFill>
+                        <a:schemeClr val="tx1"/>
+                      </a:solidFill>
+                      <a:prstDash val="solid"/>
+                      <a:round/>
+                      <a:headEnd type="none" w="med" len="med"/>
+                      <a:tailEnd type="none" w="med" len="med"/>
+                    </a:lnL>
+                    <a:lnR w="12700" cap="flat" cmpd="sng" algn="ctr">
+                      <a:solidFill>
+                        <a:schemeClr val="tx1"/>
+                      </a:solidFill>
+                      <a:prstDash val="solid"/>
+                      <a:round/>
+                      <a:headEnd type="none" w="med" len="med"/>
+                      <a:tailEnd type="none" w="med" len="med"/>
+                    </a:lnR>
+                    <a:lnB w="12700" cap="flat" cmpd="sng" algn="ctr">
+                      <a:solidFill>
+                        <a:schemeClr val="tx1"/>
+                      </a:solidFill>
+                      <a:prstDash val="solid"/>
+                      <a:round/>
+                      <a:headEnd type="none" w="med" len="med"/>
+                      <a:tailEnd type="none" w="med" len="med"/>
+                    </a:lnB>
+                    <a:noFill/>
+                  </a:tcPr>
+                </a:tc>
+                <a:tc>
+                  <a:txBody>
+                    <a:bodyPr/>
+                    <a:lstStyle/>
+                    <a:p>
+                      <a:pPr marL="0" algn="ctr" defTabSz="685800" rtl="0" eaLnBrk="1" latinLnBrk="0" hangingPunct="1"/>
+                      <a:r>
+                        <a:rPr lang="en-US" sz="1350" b="0" kern="1200" dirty="0">
+                          <a:solidFill>
+                            <a:schemeClr val="dk1"/>
+                          </a:solidFill>
+                          <a:latin typeface="+mn-lt"/>
+                          <a:ea typeface="+mn-ea"/>
+                          <a:cs typeface="+mn-cs"/>
+                        </a:rPr>
                         <a:t>$ 13.00</a:t>
                       </a:r>
                     </a:p>
@@ -14501,11 +15420,63 @@
                     <a:p>
                       <a:r>
                         <a:rPr lang="en-US" dirty="0"/>
-                        <a:t>Q-Value (LSPI)</a:t>
+                        <a:t>Q-Value (DQL)</a:t>
                       </a:r>
                     </a:p>
                   </a:txBody>
                   <a:tcPr>
+                    <a:lnR w="12700" cap="flat" cmpd="sng" algn="ctr">
+                      <a:solidFill>
+                        <a:schemeClr val="tx1"/>
+                      </a:solidFill>
+                      <a:prstDash val="solid"/>
+                      <a:round/>
+                      <a:headEnd type="none" w="med" len="med"/>
+                      <a:tailEnd type="none" w="med" len="med"/>
+                    </a:lnR>
+                    <a:lnT w="12700" cap="flat" cmpd="sng" algn="ctr">
+                      <a:solidFill>
+                        <a:schemeClr val="tx1"/>
+                      </a:solidFill>
+                      <a:prstDash val="solid"/>
+                      <a:round/>
+                      <a:headEnd type="none" w="med" len="med"/>
+                      <a:tailEnd type="none" w="med" len="med"/>
+                    </a:lnT>
+                    <a:lnB w="12700" cap="flat" cmpd="sng" algn="ctr">
+                      <a:solidFill>
+                        <a:schemeClr val="tx1"/>
+                      </a:solidFill>
+                      <a:prstDash val="solid"/>
+                      <a:round/>
+                      <a:headEnd type="none" w="med" len="med"/>
+                      <a:tailEnd type="none" w="med" len="med"/>
+                    </a:lnB>
+                    <a:noFill/>
+                  </a:tcPr>
+                </a:tc>
+                <a:tc>
+                  <a:txBody>
+                    <a:bodyPr/>
+                    <a:lstStyle/>
+                    <a:p>
+                      <a:pPr algn="ctr"/>
+                      <a:r>
+                        <a:rPr lang="en-US" dirty="0"/>
+                        <a:t>$ 3.56</a:t>
+                      </a:r>
+                    </a:p>
+                  </a:txBody>
+                  <a:tcPr>
+                    <a:lnL w="12700" cap="flat" cmpd="sng" algn="ctr">
+                      <a:solidFill>
+                        <a:schemeClr val="tx1"/>
+                      </a:solidFill>
+                      <a:prstDash val="solid"/>
+                      <a:round/>
+                      <a:headEnd type="none" w="med" len="med"/>
+                      <a:tailEnd type="none" w="med" len="med"/>
+                    </a:lnL>
                     <a:lnR w="12700" cap="flat" cmpd="sng" algn="ctr">
                       <a:solidFill>
                         <a:schemeClr val="tx1"/>
@@ -14783,7 +15754,7 @@
                       <a:pPr algn="ctr"/>
                       <a:r>
                         <a:rPr lang="en-US" dirty="0"/>
-                        <a:t>Stop</a:t>
+                        <a:t>Continue</a:t>
                       </a:r>
                     </a:p>
                   </a:txBody>
@@ -14826,7 +15797,50 @@
                       <a:pPr algn="ctr"/>
                       <a:r>
                         <a:rPr lang="en-US" dirty="0"/>
-                        <a:t>Continue</a:t>
+                        <a:t>Stop</a:t>
+                      </a:r>
+                    </a:p>
+                  </a:txBody>
+                  <a:tcPr>
+                    <a:lnL w="12700" cap="flat" cmpd="sng" algn="ctr">
+                      <a:solidFill>
+                        <a:schemeClr val="tx1"/>
+                      </a:solidFill>
+                      <a:prstDash val="solid"/>
+                      <a:round/>
+                      <a:headEnd type="none" w="med" len="med"/>
+                      <a:tailEnd type="none" w="med" len="med"/>
+                    </a:lnL>
+                    <a:lnR w="12700" cap="flat" cmpd="sng" algn="ctr">
+                      <a:solidFill>
+                        <a:schemeClr val="tx1"/>
+                      </a:solidFill>
+                      <a:prstDash val="solid"/>
+                      <a:round/>
+                      <a:headEnd type="none" w="med" len="med"/>
+                      <a:tailEnd type="none" w="med" len="med"/>
+                    </a:lnR>
+                    <a:lnT w="12700" cap="flat" cmpd="sng" algn="ctr">
+                      <a:solidFill>
+                        <a:schemeClr val="tx1"/>
+                      </a:solidFill>
+                      <a:prstDash val="solid"/>
+                      <a:round/>
+                      <a:headEnd type="none" w="med" len="med"/>
+                      <a:tailEnd type="none" w="med" len="med"/>
+                    </a:lnT>
+                    <a:noFill/>
+                  </a:tcPr>
+                </a:tc>
+                <a:tc>
+                  <a:txBody>
+                    <a:bodyPr/>
+                    <a:lstStyle/>
+                    <a:p>
+                      <a:pPr algn="ctr"/>
+                      <a:r>
+                        <a:rPr lang="en-US" dirty="0"/>
+                        <a:t>Stop</a:t>
                       </a:r>
                     </a:p>
                   </a:txBody>

</xml_diff>